<commit_message>
Complete key press procedure
</commit_message>
<xml_diff>
--- a/stim/instructions.pptx
+++ b/stim/instructions.pptx
@@ -6,20 +6,21 @@
   </p:sldMasterIdLst>
   <p:sldIdLst>
     <p:sldId id="256" r:id="rId2"/>
-    <p:sldId id="262" r:id="rId3"/>
-    <p:sldId id="269" r:id="rId4"/>
-    <p:sldId id="270" r:id="rId5"/>
-    <p:sldId id="257" r:id="rId6"/>
-    <p:sldId id="263" r:id="rId7"/>
-    <p:sldId id="258" r:id="rId8"/>
-    <p:sldId id="264" r:id="rId9"/>
-    <p:sldId id="259" r:id="rId10"/>
-    <p:sldId id="265" r:id="rId11"/>
-    <p:sldId id="260" r:id="rId12"/>
-    <p:sldId id="266" r:id="rId13"/>
-    <p:sldId id="261" r:id="rId14"/>
-    <p:sldId id="267" r:id="rId15"/>
-    <p:sldId id="268" r:id="rId16"/>
+    <p:sldId id="271" r:id="rId3"/>
+    <p:sldId id="262" r:id="rId4"/>
+    <p:sldId id="269" r:id="rId5"/>
+    <p:sldId id="270" r:id="rId6"/>
+    <p:sldId id="257" r:id="rId7"/>
+    <p:sldId id="263" r:id="rId8"/>
+    <p:sldId id="258" r:id="rId9"/>
+    <p:sldId id="264" r:id="rId10"/>
+    <p:sldId id="259" r:id="rId11"/>
+    <p:sldId id="265" r:id="rId12"/>
+    <p:sldId id="260" r:id="rId13"/>
+    <p:sldId id="266" r:id="rId14"/>
+    <p:sldId id="261" r:id="rId15"/>
+    <p:sldId id="267" r:id="rId16"/>
+    <p:sldId id="268" r:id="rId17"/>
   </p:sldIdLst>
   <p:sldSz cx="12192000" cy="6858000"/>
   <p:notesSz cx="6858000" cy="9144000"/>
@@ -273,7 +274,7 @@
           <a:p>
             <a:fld id="{EEF644FE-562C-401D-8F4D-8C6CAC9B5F76}" type="datetimeFigureOut">
               <a:rPr lang="en-US" smtClean="0"/>
-              <a:t>11/22/2024</a:t>
+              <a:t>11/25/2024</a:t>
             </a:fld>
             <a:endParaRPr lang="en-US"/>
           </a:p>
@@ -471,7 +472,7 @@
           <a:p>
             <a:fld id="{EEF644FE-562C-401D-8F4D-8C6CAC9B5F76}" type="datetimeFigureOut">
               <a:rPr lang="en-US" smtClean="0"/>
-              <a:t>11/22/2024</a:t>
+              <a:t>11/25/2024</a:t>
             </a:fld>
             <a:endParaRPr lang="en-US"/>
           </a:p>
@@ -679,7 +680,7 @@
           <a:p>
             <a:fld id="{EEF644FE-562C-401D-8F4D-8C6CAC9B5F76}" type="datetimeFigureOut">
               <a:rPr lang="en-US" smtClean="0"/>
-              <a:t>11/22/2024</a:t>
+              <a:t>11/25/2024</a:t>
             </a:fld>
             <a:endParaRPr lang="en-US"/>
           </a:p>
@@ -877,7 +878,7 @@
           <a:p>
             <a:fld id="{EEF644FE-562C-401D-8F4D-8C6CAC9B5F76}" type="datetimeFigureOut">
               <a:rPr lang="en-US" smtClean="0"/>
-              <a:t>11/22/2024</a:t>
+              <a:t>11/25/2024</a:t>
             </a:fld>
             <a:endParaRPr lang="en-US"/>
           </a:p>
@@ -1152,7 +1153,7 @@
           <a:p>
             <a:fld id="{EEF644FE-562C-401D-8F4D-8C6CAC9B5F76}" type="datetimeFigureOut">
               <a:rPr lang="en-US" smtClean="0"/>
-              <a:t>11/22/2024</a:t>
+              <a:t>11/25/2024</a:t>
             </a:fld>
             <a:endParaRPr lang="en-US"/>
           </a:p>
@@ -1417,7 +1418,7 @@
           <a:p>
             <a:fld id="{EEF644FE-562C-401D-8F4D-8C6CAC9B5F76}" type="datetimeFigureOut">
               <a:rPr lang="en-US" smtClean="0"/>
-              <a:t>11/22/2024</a:t>
+              <a:t>11/25/2024</a:t>
             </a:fld>
             <a:endParaRPr lang="en-US"/>
           </a:p>
@@ -1829,7 +1830,7 @@
           <a:p>
             <a:fld id="{EEF644FE-562C-401D-8F4D-8C6CAC9B5F76}" type="datetimeFigureOut">
               <a:rPr lang="en-US" smtClean="0"/>
-              <a:t>11/22/2024</a:t>
+              <a:t>11/25/2024</a:t>
             </a:fld>
             <a:endParaRPr lang="en-US"/>
           </a:p>
@@ -1970,7 +1971,7 @@
           <a:p>
             <a:fld id="{EEF644FE-562C-401D-8F4D-8C6CAC9B5F76}" type="datetimeFigureOut">
               <a:rPr lang="en-US" smtClean="0"/>
-              <a:t>11/22/2024</a:t>
+              <a:t>11/25/2024</a:t>
             </a:fld>
             <a:endParaRPr lang="en-US"/>
           </a:p>
@@ -2083,7 +2084,7 @@
           <a:p>
             <a:fld id="{EEF644FE-562C-401D-8F4D-8C6CAC9B5F76}" type="datetimeFigureOut">
               <a:rPr lang="en-US" smtClean="0"/>
-              <a:t>11/22/2024</a:t>
+              <a:t>11/25/2024</a:t>
             </a:fld>
             <a:endParaRPr lang="en-US"/>
           </a:p>
@@ -2394,7 +2395,7 @@
           <a:p>
             <a:fld id="{EEF644FE-562C-401D-8F4D-8C6CAC9B5F76}" type="datetimeFigureOut">
               <a:rPr lang="en-US" smtClean="0"/>
-              <a:t>11/22/2024</a:t>
+              <a:t>11/25/2024</a:t>
             </a:fld>
             <a:endParaRPr lang="en-US"/>
           </a:p>
@@ -2682,7 +2683,7 @@
           <a:p>
             <a:fld id="{EEF644FE-562C-401D-8F4D-8C6CAC9B5F76}" type="datetimeFigureOut">
               <a:rPr lang="en-US" smtClean="0"/>
-              <a:t>11/22/2024</a:t>
+              <a:t>11/25/2024</a:t>
             </a:fld>
             <a:endParaRPr lang="en-US"/>
           </a:p>
@@ -2923,7 +2924,7 @@
           <a:p>
             <a:fld id="{EEF644FE-562C-401D-8F4D-8C6CAC9B5F76}" type="datetimeFigureOut">
               <a:rPr lang="en-US" smtClean="0"/>
-              <a:t>11/22/2024</a:t>
+              <a:t>11/25/2024</a:t>
             </a:fld>
             <a:endParaRPr lang="en-US"/>
           </a:p>
@@ -3392,6 +3393,72 @@
 <file path=ppt/slides/slide10.xml><?xml version="1.0" encoding="utf-8"?>
 <p:sld xmlns:a="http://schemas.openxmlformats.org/drawingml/2006/main" xmlns:r="http://schemas.openxmlformats.org/officeDocument/2006/relationships" xmlns:p="http://schemas.openxmlformats.org/presentationml/2006/main">
   <p:cSld>
+    <p:spTree>
+      <p:nvGrpSpPr>
+        <p:cNvPr id="1" name=""/>
+        <p:cNvGrpSpPr/>
+        <p:nvPr/>
+      </p:nvGrpSpPr>
+      <p:grpSpPr>
+        <a:xfrm>
+          <a:off x="0" y="0"/>
+          <a:ext cx="0" cy="0"/>
+          <a:chOff x="0" y="0"/>
+          <a:chExt cx="0" cy="0"/>
+        </a:xfrm>
+      </p:grpSpPr>
+      <p:pic>
+        <p:nvPicPr>
+          <p:cNvPr id="5" name="Picture 4" descr="A black and white screen with white text&#10;&#10;Description automatically generated">
+            <a:extLst>
+              <a:ext uri="{FF2B5EF4-FFF2-40B4-BE49-F238E27FC236}">
+                <a16:creationId xmlns:a16="http://schemas.microsoft.com/office/drawing/2014/main" id="{F01B4522-C1CA-218C-8710-B2D2D169BFE8}"/>
+              </a:ext>
+            </a:extLst>
+          </p:cNvPr>
+          <p:cNvPicPr>
+            <a:picLocks noChangeAspect="1"/>
+          </p:cNvPicPr>
+          <p:nvPr/>
+        </p:nvPicPr>
+        <p:blipFill>
+          <a:blip r:embed="rId2">
+            <a:extLst>
+              <a:ext uri="{28A0092B-C50C-407E-A947-70E740481C1C}">
+                <a14:useLocalDpi xmlns:a14="http://schemas.microsoft.com/office/drawing/2010/main" val="0"/>
+              </a:ext>
+            </a:extLst>
+          </a:blip>
+          <a:stretch>
+            <a:fillRect/>
+          </a:stretch>
+        </p:blipFill>
+        <p:spPr>
+          <a:xfrm>
+            <a:off x="0" y="4762"/>
+            <a:ext cx="12192000" cy="6848475"/>
+          </a:xfrm>
+          <a:prstGeom prst="rect">
+            <a:avLst/>
+          </a:prstGeom>
+        </p:spPr>
+      </p:pic>
+    </p:spTree>
+    <p:extLst>
+      <p:ext uri="{BB962C8B-B14F-4D97-AF65-F5344CB8AC3E}">
+        <p14:creationId xmlns:p14="http://schemas.microsoft.com/office/powerpoint/2010/main" val="1319310568"/>
+      </p:ext>
+    </p:extLst>
+  </p:cSld>
+  <p:clrMapOvr>
+    <a:masterClrMapping/>
+  </p:clrMapOvr>
+</p:sld>
+</file>
+
+<file path=ppt/slides/slide11.xml><?xml version="1.0" encoding="utf-8"?>
+<p:sld xmlns:a="http://schemas.openxmlformats.org/drawingml/2006/main" xmlns:r="http://schemas.openxmlformats.org/officeDocument/2006/relationships" xmlns:p="http://schemas.openxmlformats.org/presentationml/2006/main">
+  <p:cSld>
     <p:bg>
       <p:bgPr>
         <a:solidFill>
@@ -3683,7 +3750,7 @@
 </p:sld>
 </file>
 
-<file path=ppt/slides/slide11.xml><?xml version="1.0" encoding="utf-8"?>
+<file path=ppt/slides/slide12.xml><?xml version="1.0" encoding="utf-8"?>
 <p:sld xmlns:a="http://schemas.openxmlformats.org/drawingml/2006/main" xmlns:r="http://schemas.openxmlformats.org/officeDocument/2006/relationships" xmlns:p="http://schemas.openxmlformats.org/presentationml/2006/main">
   <p:cSld>
     <p:spTree>
@@ -3749,7 +3816,7 @@
 </p:sld>
 </file>
 
-<file path=ppt/slides/slide12.xml><?xml version="1.0" encoding="utf-8"?>
+<file path=ppt/slides/slide13.xml><?xml version="1.0" encoding="utf-8"?>
 <p:sld xmlns:a="http://schemas.openxmlformats.org/drawingml/2006/main" xmlns:r="http://schemas.openxmlformats.org/officeDocument/2006/relationships" xmlns:p="http://schemas.openxmlformats.org/presentationml/2006/main">
   <p:cSld>
     <p:bg>
@@ -3958,7 +4025,7 @@
 </p:sld>
 </file>
 
-<file path=ppt/slides/slide13.xml><?xml version="1.0" encoding="utf-8"?>
+<file path=ppt/slides/slide14.xml><?xml version="1.0" encoding="utf-8"?>
 <p:sld xmlns:a="http://schemas.openxmlformats.org/drawingml/2006/main" xmlns:r="http://schemas.openxmlformats.org/officeDocument/2006/relationships" xmlns:p="http://schemas.openxmlformats.org/presentationml/2006/main">
   <p:cSld>
     <p:spTree>
@@ -4024,7 +4091,7 @@
 </p:sld>
 </file>
 
-<file path=ppt/slides/slide14.xml><?xml version="1.0" encoding="utf-8"?>
+<file path=ppt/slides/slide15.xml><?xml version="1.0" encoding="utf-8"?>
 <p:sld xmlns:a="http://schemas.openxmlformats.org/drawingml/2006/main" xmlns:r="http://schemas.openxmlformats.org/officeDocument/2006/relationships" xmlns:p="http://schemas.openxmlformats.org/presentationml/2006/main">
   <p:cSld>
     <p:bg>
@@ -4228,7 +4295,7 @@
 </p:sld>
 </file>
 
-<file path=ppt/slides/slide15.xml><?xml version="1.0" encoding="utf-8"?>
+<file path=ppt/slides/slide16.xml><?xml version="1.0" encoding="utf-8"?>
 <p:sld xmlns:a="http://schemas.openxmlformats.org/drawingml/2006/main" xmlns:r="http://schemas.openxmlformats.org/officeDocument/2006/relationships" xmlns:p="http://schemas.openxmlformats.org/presentationml/2006/main">
   <p:cSld>
     <p:bg>
@@ -4440,6 +4507,85 @@
         <p:cNvPr id="1" name="">
           <a:extLst>
             <a:ext uri="{FF2B5EF4-FFF2-40B4-BE49-F238E27FC236}">
+              <a16:creationId xmlns:a16="http://schemas.microsoft.com/office/drawing/2014/main" id="{A8DC1DD5-8C07-12C3-EDEB-3A1D316C45F2}"/>
+            </a:ext>
+          </a:extLst>
+        </p:cNvPr>
+        <p:cNvGrpSpPr/>
+        <p:nvPr/>
+      </p:nvGrpSpPr>
+      <p:grpSpPr>
+        <a:xfrm>
+          <a:off x="0" y="0"/>
+          <a:ext cx="0" cy="0"/>
+          <a:chOff x="0" y="0"/>
+          <a:chExt cx="0" cy="0"/>
+        </a:xfrm>
+      </p:grpSpPr>
+      <p:pic>
+        <p:nvPicPr>
+          <p:cNvPr id="17" name="Picture 16" descr="A black and white screen with white text&#10;&#10;Description automatically generated">
+            <a:extLst>
+              <a:ext uri="{FF2B5EF4-FFF2-40B4-BE49-F238E27FC236}">
+                <a16:creationId xmlns:a16="http://schemas.microsoft.com/office/drawing/2014/main" id="{B399CEB3-300A-1F24-8C89-A1F284CBF784}"/>
+              </a:ext>
+            </a:extLst>
+          </p:cNvPr>
+          <p:cNvPicPr>
+            <a:picLocks noChangeAspect="1"/>
+          </p:cNvPicPr>
+          <p:nvPr/>
+        </p:nvPicPr>
+        <p:blipFill>
+          <a:blip r:embed="rId2">
+            <a:extLst>
+              <a:ext uri="{28A0092B-C50C-407E-A947-70E740481C1C}">
+                <a14:useLocalDpi xmlns:a14="http://schemas.microsoft.com/office/drawing/2010/main" val="0"/>
+              </a:ext>
+            </a:extLst>
+          </a:blip>
+          <a:srcRect t="41766" b="41025"/>
+          <a:stretch/>
+        </p:blipFill>
+        <p:spPr>
+          <a:xfrm>
+            <a:off x="0" y="2865121"/>
+            <a:ext cx="12192000" cy="1178560"/>
+          </a:xfrm>
+          <a:prstGeom prst="rect">
+            <a:avLst/>
+          </a:prstGeom>
+        </p:spPr>
+      </p:pic>
+    </p:spTree>
+    <p:extLst>
+      <p:ext uri="{BB962C8B-B14F-4D97-AF65-F5344CB8AC3E}">
+        <p14:creationId xmlns:p14="http://schemas.microsoft.com/office/powerpoint/2010/main" val="1270078512"/>
+      </p:ext>
+    </p:extLst>
+  </p:cSld>
+  <p:clrMapOvr>
+    <a:masterClrMapping/>
+  </p:clrMapOvr>
+</p:sld>
+</file>
+
+<file path=ppt/slides/slide3.xml><?xml version="1.0" encoding="utf-8"?>
+<p:sld xmlns:a="http://schemas.openxmlformats.org/drawingml/2006/main" xmlns:r="http://schemas.openxmlformats.org/officeDocument/2006/relationships" xmlns:p="http://schemas.openxmlformats.org/presentationml/2006/main">
+  <p:cSld>
+    <p:bg>
+      <p:bgPr>
+        <a:solidFill>
+          <a:schemeClr val="tx1"/>
+        </a:solidFill>
+        <a:effectLst/>
+      </p:bgPr>
+    </p:bg>
+    <p:spTree>
+      <p:nvGrpSpPr>
+        <p:cNvPr id="1" name="">
+          <a:extLst>
+            <a:ext uri="{FF2B5EF4-FFF2-40B4-BE49-F238E27FC236}">
               <a16:creationId xmlns:a16="http://schemas.microsoft.com/office/drawing/2014/main" id="{3EC038DD-7D9C-66B0-34FD-E37D4B29028C}"/>
             </a:ext>
           </a:extLst>
@@ -4742,7 +4888,7 @@
 </p:sld>
 </file>
 
-<file path=ppt/slides/slide3.xml><?xml version="1.0" encoding="utf-8"?>
+<file path=ppt/slides/slide4.xml><?xml version="1.0" encoding="utf-8"?>
 <p:sld xmlns:a="http://schemas.openxmlformats.org/drawingml/2006/main" xmlns:r="http://schemas.openxmlformats.org/officeDocument/2006/relationships" xmlns:p="http://schemas.openxmlformats.org/presentationml/2006/main">
   <p:cSld>
     <p:bg>
@@ -5144,7 +5290,7 @@
 </p:sld>
 </file>
 
-<file path=ppt/slides/slide4.xml><?xml version="1.0" encoding="utf-8"?>
+<file path=ppt/slides/slide5.xml><?xml version="1.0" encoding="utf-8"?>
 <p:sld xmlns:a="http://schemas.openxmlformats.org/drawingml/2006/main" xmlns:r="http://schemas.openxmlformats.org/officeDocument/2006/relationships" xmlns:p="http://schemas.openxmlformats.org/presentationml/2006/main">
   <p:cSld>
     <p:bg>
@@ -5582,7 +5728,7 @@
 </p:sld>
 </file>
 
-<file path=ppt/slides/slide5.xml><?xml version="1.0" encoding="utf-8"?>
+<file path=ppt/slides/slide6.xml><?xml version="1.0" encoding="utf-8"?>
 <p:sld xmlns:a="http://schemas.openxmlformats.org/drawingml/2006/main" xmlns:r="http://schemas.openxmlformats.org/officeDocument/2006/relationships" xmlns:p="http://schemas.openxmlformats.org/presentationml/2006/main">
   <p:cSld>
     <p:spTree>
@@ -5648,7 +5794,7 @@
 </p:sld>
 </file>
 
-<file path=ppt/slides/slide6.xml><?xml version="1.0" encoding="utf-8"?>
+<file path=ppt/slides/slide7.xml><?xml version="1.0" encoding="utf-8"?>
 <p:sld xmlns:a="http://schemas.openxmlformats.org/drawingml/2006/main" xmlns:r="http://schemas.openxmlformats.org/officeDocument/2006/relationships" xmlns:p="http://schemas.openxmlformats.org/presentationml/2006/main">
   <p:cSld>
     <p:bg>
@@ -5949,7 +6095,7 @@
 </p:sld>
 </file>
 
-<file path=ppt/slides/slide7.xml><?xml version="1.0" encoding="utf-8"?>
+<file path=ppt/slides/slide8.xml><?xml version="1.0" encoding="utf-8"?>
 <p:sld xmlns:a="http://schemas.openxmlformats.org/drawingml/2006/main" xmlns:r="http://schemas.openxmlformats.org/officeDocument/2006/relationships" xmlns:p="http://schemas.openxmlformats.org/presentationml/2006/main">
   <p:cSld>
     <p:spTree>
@@ -6015,7 +6161,7 @@
 </p:sld>
 </file>
 
-<file path=ppt/slides/slide8.xml><?xml version="1.0" encoding="utf-8"?>
+<file path=ppt/slides/slide9.xml><?xml version="1.0" encoding="utf-8"?>
 <p:sld xmlns:a="http://schemas.openxmlformats.org/drawingml/2006/main" xmlns:r="http://schemas.openxmlformats.org/officeDocument/2006/relationships" xmlns:p="http://schemas.openxmlformats.org/presentationml/2006/main">
   <p:cSld>
     <p:bg>
@@ -6306,72 +6452,6 @@
     <p:extLst>
       <p:ext uri="{BB962C8B-B14F-4D97-AF65-F5344CB8AC3E}">
         <p14:creationId xmlns:p14="http://schemas.microsoft.com/office/powerpoint/2010/main" val="1136285772"/>
-      </p:ext>
-    </p:extLst>
-  </p:cSld>
-  <p:clrMapOvr>
-    <a:masterClrMapping/>
-  </p:clrMapOvr>
-</p:sld>
-</file>
-
-<file path=ppt/slides/slide9.xml><?xml version="1.0" encoding="utf-8"?>
-<p:sld xmlns:a="http://schemas.openxmlformats.org/drawingml/2006/main" xmlns:r="http://schemas.openxmlformats.org/officeDocument/2006/relationships" xmlns:p="http://schemas.openxmlformats.org/presentationml/2006/main">
-  <p:cSld>
-    <p:spTree>
-      <p:nvGrpSpPr>
-        <p:cNvPr id="1" name=""/>
-        <p:cNvGrpSpPr/>
-        <p:nvPr/>
-      </p:nvGrpSpPr>
-      <p:grpSpPr>
-        <a:xfrm>
-          <a:off x="0" y="0"/>
-          <a:ext cx="0" cy="0"/>
-          <a:chOff x="0" y="0"/>
-          <a:chExt cx="0" cy="0"/>
-        </a:xfrm>
-      </p:grpSpPr>
-      <p:pic>
-        <p:nvPicPr>
-          <p:cNvPr id="5" name="Picture 4" descr="A black and white screen with white text&#10;&#10;Description automatically generated">
-            <a:extLst>
-              <a:ext uri="{FF2B5EF4-FFF2-40B4-BE49-F238E27FC236}">
-                <a16:creationId xmlns:a16="http://schemas.microsoft.com/office/drawing/2014/main" id="{F01B4522-C1CA-218C-8710-B2D2D169BFE8}"/>
-              </a:ext>
-            </a:extLst>
-          </p:cNvPr>
-          <p:cNvPicPr>
-            <a:picLocks noChangeAspect="1"/>
-          </p:cNvPicPr>
-          <p:nvPr/>
-        </p:nvPicPr>
-        <p:blipFill>
-          <a:blip r:embed="rId2">
-            <a:extLst>
-              <a:ext uri="{28A0092B-C50C-407E-A947-70E740481C1C}">
-                <a14:useLocalDpi xmlns:a14="http://schemas.microsoft.com/office/drawing/2010/main" val="0"/>
-              </a:ext>
-            </a:extLst>
-          </a:blip>
-          <a:stretch>
-            <a:fillRect/>
-          </a:stretch>
-        </p:blipFill>
-        <p:spPr>
-          <a:xfrm>
-            <a:off x="0" y="4762"/>
-            <a:ext cx="12192000" cy="6848475"/>
-          </a:xfrm>
-          <a:prstGeom prst="rect">
-            <a:avLst/>
-          </a:prstGeom>
-        </p:spPr>
-      </p:pic>
-    </p:spTree>
-    <p:extLst>
-      <p:ext uri="{BB962C8B-B14F-4D97-AF65-F5344CB8AC3E}">
-        <p14:creationId xmlns:p14="http://schemas.microsoft.com/office/powerpoint/2010/main" val="1319310568"/>
       </p:ext>
     </p:extLst>
   </p:cSld>

</xml_diff>

<commit_message>
updated practice mixed instruction for the 1 * *2 ** version of retrocue
</commit_message>
<xml_diff>
--- a/stim/instructions.pptx
+++ b/stim/instructions.pptx
@@ -270,7 +270,7 @@
           <a:p>
             <a:fld id="{EEF644FE-562C-401D-8F4D-8C6CAC9B5F76}" type="datetimeFigureOut">
               <a:rPr lang="en-US" smtClean="0"/>
-              <a:t>12/7/2024</a:t>
+              <a:t>12/9/2024</a:t>
             </a:fld>
             <a:endParaRPr lang="en-US"/>
           </a:p>
@@ -468,7 +468,7 @@
           <a:p>
             <a:fld id="{EEF644FE-562C-401D-8F4D-8C6CAC9B5F76}" type="datetimeFigureOut">
               <a:rPr lang="en-US" smtClean="0"/>
-              <a:t>12/7/2024</a:t>
+              <a:t>12/9/2024</a:t>
             </a:fld>
             <a:endParaRPr lang="en-US"/>
           </a:p>
@@ -676,7 +676,7 @@
           <a:p>
             <a:fld id="{EEF644FE-562C-401D-8F4D-8C6CAC9B5F76}" type="datetimeFigureOut">
               <a:rPr lang="en-US" smtClean="0"/>
-              <a:t>12/7/2024</a:t>
+              <a:t>12/9/2024</a:t>
             </a:fld>
             <a:endParaRPr lang="en-US"/>
           </a:p>
@@ -874,7 +874,7 @@
           <a:p>
             <a:fld id="{EEF644FE-562C-401D-8F4D-8C6CAC9B5F76}" type="datetimeFigureOut">
               <a:rPr lang="en-US" smtClean="0"/>
-              <a:t>12/7/2024</a:t>
+              <a:t>12/9/2024</a:t>
             </a:fld>
             <a:endParaRPr lang="en-US"/>
           </a:p>
@@ -1149,7 +1149,7 @@
           <a:p>
             <a:fld id="{EEF644FE-562C-401D-8F4D-8C6CAC9B5F76}" type="datetimeFigureOut">
               <a:rPr lang="en-US" smtClean="0"/>
-              <a:t>12/7/2024</a:t>
+              <a:t>12/9/2024</a:t>
             </a:fld>
             <a:endParaRPr lang="en-US"/>
           </a:p>
@@ -1414,7 +1414,7 @@
           <a:p>
             <a:fld id="{EEF644FE-562C-401D-8F4D-8C6CAC9B5F76}" type="datetimeFigureOut">
               <a:rPr lang="en-US" smtClean="0"/>
-              <a:t>12/7/2024</a:t>
+              <a:t>12/9/2024</a:t>
             </a:fld>
             <a:endParaRPr lang="en-US"/>
           </a:p>
@@ -1826,7 +1826,7 @@
           <a:p>
             <a:fld id="{EEF644FE-562C-401D-8F4D-8C6CAC9B5F76}" type="datetimeFigureOut">
               <a:rPr lang="en-US" smtClean="0"/>
-              <a:t>12/7/2024</a:t>
+              <a:t>12/9/2024</a:t>
             </a:fld>
             <a:endParaRPr lang="en-US"/>
           </a:p>
@@ -1967,7 +1967,7 @@
           <a:p>
             <a:fld id="{EEF644FE-562C-401D-8F4D-8C6CAC9B5F76}" type="datetimeFigureOut">
               <a:rPr lang="en-US" smtClean="0"/>
-              <a:t>12/7/2024</a:t>
+              <a:t>12/9/2024</a:t>
             </a:fld>
             <a:endParaRPr lang="en-US"/>
           </a:p>
@@ -2080,7 +2080,7 @@
           <a:p>
             <a:fld id="{EEF644FE-562C-401D-8F4D-8C6CAC9B5F76}" type="datetimeFigureOut">
               <a:rPr lang="en-US" smtClean="0"/>
-              <a:t>12/7/2024</a:t>
+              <a:t>12/9/2024</a:t>
             </a:fld>
             <a:endParaRPr lang="en-US"/>
           </a:p>
@@ -2391,7 +2391,7 @@
           <a:p>
             <a:fld id="{EEF644FE-562C-401D-8F4D-8C6CAC9B5F76}" type="datetimeFigureOut">
               <a:rPr lang="en-US" smtClean="0"/>
-              <a:t>12/7/2024</a:t>
+              <a:t>12/9/2024</a:t>
             </a:fld>
             <a:endParaRPr lang="en-US"/>
           </a:p>
@@ -2679,7 +2679,7 @@
           <a:p>
             <a:fld id="{EEF644FE-562C-401D-8F4D-8C6CAC9B5F76}" type="datetimeFigureOut">
               <a:rPr lang="en-US" smtClean="0"/>
-              <a:t>12/7/2024</a:t>
+              <a:t>12/9/2024</a:t>
             </a:fld>
             <a:endParaRPr lang="en-US"/>
           </a:p>
@@ -2923,7 +2923,7 @@
           <a:p>
             <a:fld id="{EEF644FE-562C-401D-8F4D-8C6CAC9B5F76}" type="datetimeFigureOut">
               <a:rPr lang="en-US" smtClean="0"/>
-              <a:t>12/7/2024</a:t>
+              <a:t>12/9/2024</a:t>
             </a:fld>
             <a:endParaRPr lang="en-US"/>
           </a:p>
@@ -5433,8 +5433,8 @@
         </p:nvSpPr>
         <p:spPr>
           <a:xfrm>
-            <a:off x="3421999" y="540132"/>
-            <a:ext cx="5348002" cy="5777736"/>
+            <a:off x="4834239" y="540132"/>
+            <a:ext cx="4609019" cy="5777736"/>
           </a:xfrm>
           <a:prstGeom prst="rect">
             <a:avLst/>
@@ -5460,7 +5460,7 @@
                 <a:effectLst/>
                 <a:latin typeface="Menlo"/>
               </a:rPr>
-              <a:t>1 2  </a:t>
+              <a:t>   </a:t>
             </a:r>
             <a:r>
               <a:rPr lang="en-US" sz="3900" b="0" i="0" dirty="0">
@@ -5486,7 +5486,7 @@
                 </a:solidFill>
                 <a:latin typeface="Menlo"/>
               </a:rPr>
-              <a:t>1     </a:t>
+              <a:t>   </a:t>
             </a:r>
             <a:r>
               <a:rPr lang="en-US" sz="3900" dirty="0">
@@ -5505,6 +5505,15 @@
               </a:lnSpc>
             </a:pPr>
             <a:r>
+              <a:rPr lang="en-US" sz="6000" dirty="0">
+                <a:solidFill>
+                  <a:schemeClr val="bg1"/>
+                </a:solidFill>
+                <a:latin typeface="Menlo"/>
+              </a:rPr>
+              <a:t> </a:t>
+            </a:r>
+            <a:r>
               <a:rPr lang="en-US" sz="6000" b="0" i="0" dirty="0">
                 <a:solidFill>
                   <a:schemeClr val="bg1"/>
@@ -5512,7 +5521,7 @@
                 <a:effectLst/>
                 <a:latin typeface="Menlo"/>
               </a:rPr>
-              <a:t>2     </a:t>
+              <a:t>  </a:t>
             </a:r>
             <a:r>
               <a:rPr lang="en-US" sz="3900" b="0" i="0" dirty="0">
@@ -5538,7 +5547,7 @@
                 </a:solidFill>
                 <a:latin typeface="Menlo"/>
               </a:rPr>
-              <a:t>2 1  </a:t>
+              <a:t>   </a:t>
             </a:r>
             <a:r>
               <a:rPr lang="en-US" sz="3900" dirty="0">
@@ -5564,7 +5573,7 @@
                 <a:effectLst/>
                 <a:latin typeface="Menlo"/>
               </a:rPr>
-              <a:t>0     </a:t>
+              <a:t>   </a:t>
             </a:r>
             <a:r>
               <a:rPr lang="en-US" sz="3900" b="0" i="0" dirty="0">
@@ -5579,6 +5588,397 @@
           </a:p>
         </p:txBody>
       </p:sp>
+      <p:sp>
+        <p:nvSpPr>
+          <p:cNvPr id="3" name="TextBox 2">
+            <a:extLst>
+              <a:ext uri="{FF2B5EF4-FFF2-40B4-BE49-F238E27FC236}">
+                <a16:creationId xmlns:a16="http://schemas.microsoft.com/office/drawing/2014/main" id="{02D7FE6F-5A6D-B3A4-5FCF-F7EA8AF12352}"/>
+              </a:ext>
+            </a:extLst>
+          </p:cNvPr>
+          <p:cNvSpPr txBox="1"/>
+          <p:nvPr/>
+        </p:nvSpPr>
+        <p:spPr>
+          <a:xfrm>
+            <a:off x="3491438" y="659825"/>
+            <a:ext cx="1431802" cy="1169551"/>
+          </a:xfrm>
+          <a:prstGeom prst="rect">
+            <a:avLst/>
+          </a:prstGeom>
+          <a:noFill/>
+        </p:spPr>
+        <p:txBody>
+          <a:bodyPr wrap="none" rtlCol="0">
+            <a:spAutoFit/>
+          </a:bodyPr>
+          <a:lstStyle/>
+          <a:p>
+            <a:r>
+              <a:rPr lang="en-US" sz="7000" dirty="0">
+                <a:solidFill>
+                  <a:schemeClr val="bg1"/>
+                </a:solidFill>
+                <a:latin typeface="Arial" panose="020B0604020202020204" pitchFamily="34" charset="0"/>
+                <a:cs typeface="Arial" panose="020B0604020202020204" pitchFamily="34" charset="0"/>
+              </a:rPr>
+              <a:t>1 2</a:t>
+            </a:r>
+          </a:p>
+        </p:txBody>
+      </p:sp>
+      <p:grpSp>
+        <p:nvGrpSpPr>
+          <p:cNvPr id="4" name="Group 3">
+            <a:extLst>
+              <a:ext uri="{FF2B5EF4-FFF2-40B4-BE49-F238E27FC236}">
+                <a16:creationId xmlns:a16="http://schemas.microsoft.com/office/drawing/2014/main" id="{5BD0841F-8CCD-2B4B-37C8-F2671ADB4E72}"/>
+              </a:ext>
+            </a:extLst>
+          </p:cNvPr>
+          <p:cNvGrpSpPr/>
+          <p:nvPr/>
+        </p:nvGrpSpPr>
+        <p:grpSpPr>
+          <a:xfrm>
+            <a:off x="3502614" y="1840439"/>
+            <a:ext cx="1450091" cy="1785104"/>
+            <a:chOff x="5380098" y="2765663"/>
+            <a:chExt cx="1450091" cy="1785104"/>
+          </a:xfrm>
+        </p:grpSpPr>
+        <p:sp>
+          <p:nvSpPr>
+            <p:cNvPr id="5" name="TextBox 4">
+              <a:extLst>
+                <a:ext uri="{FF2B5EF4-FFF2-40B4-BE49-F238E27FC236}">
+                  <a16:creationId xmlns:a16="http://schemas.microsoft.com/office/drawing/2014/main" id="{F4862D04-534C-275E-990C-681317EC0006}"/>
+                </a:ext>
+              </a:extLst>
+            </p:cNvPr>
+            <p:cNvSpPr txBox="1"/>
+            <p:nvPr/>
+          </p:nvSpPr>
+          <p:spPr>
+            <a:xfrm>
+              <a:off x="5380098" y="2792850"/>
+              <a:ext cx="683200" cy="1169551"/>
+            </a:xfrm>
+            <a:prstGeom prst="rect">
+              <a:avLst/>
+            </a:prstGeom>
+            <a:noFill/>
+          </p:spPr>
+          <p:txBody>
+            <a:bodyPr wrap="none" rtlCol="0">
+              <a:spAutoFit/>
+            </a:bodyPr>
+            <a:lstStyle/>
+            <a:p>
+              <a:r>
+                <a:rPr lang="en-US" sz="7000" dirty="0">
+                  <a:solidFill>
+                    <a:schemeClr val="bg1"/>
+                  </a:solidFill>
+                  <a:latin typeface="Arial" panose="020B0604020202020204" pitchFamily="34" charset="0"/>
+                  <a:cs typeface="Arial" panose="020B0604020202020204" pitchFamily="34" charset="0"/>
+                </a:rPr>
+                <a:t>1</a:t>
+              </a:r>
+            </a:p>
+          </p:txBody>
+        </p:sp>
+        <p:sp>
+          <p:nvSpPr>
+            <p:cNvPr id="6" name="TextBox 5">
+              <a:extLst>
+                <a:ext uri="{FF2B5EF4-FFF2-40B4-BE49-F238E27FC236}">
+                  <a16:creationId xmlns:a16="http://schemas.microsoft.com/office/drawing/2014/main" id="{9C143DE6-748B-2408-6707-40D560B1FABD}"/>
+                </a:ext>
+              </a:extLst>
+            </p:cNvPr>
+            <p:cNvSpPr txBox="1"/>
+            <p:nvPr/>
+          </p:nvSpPr>
+          <p:spPr>
+            <a:xfrm>
+              <a:off x="6097296" y="2765663"/>
+              <a:ext cx="732893" cy="1785104"/>
+            </a:xfrm>
+            <a:prstGeom prst="rect">
+              <a:avLst/>
+            </a:prstGeom>
+            <a:noFill/>
+          </p:spPr>
+          <p:txBody>
+            <a:bodyPr wrap="none" rtlCol="0">
+              <a:spAutoFit/>
+            </a:bodyPr>
+            <a:lstStyle/>
+            <a:p>
+              <a:r>
+                <a:rPr lang="en-US" sz="11000" dirty="0">
+                  <a:solidFill>
+                    <a:schemeClr val="bg1"/>
+                  </a:solidFill>
+                  <a:latin typeface="Arial" panose="020B0604020202020204" pitchFamily="34" charset="0"/>
+                  <a:cs typeface="Arial" panose="020B0604020202020204" pitchFamily="34" charset="0"/>
+                </a:rPr>
+                <a:t>*</a:t>
+              </a:r>
+            </a:p>
+          </p:txBody>
+        </p:sp>
+      </p:grpSp>
+      <p:grpSp>
+        <p:nvGrpSpPr>
+          <p:cNvPr id="7" name="Group 6">
+            <a:extLst>
+              <a:ext uri="{FF2B5EF4-FFF2-40B4-BE49-F238E27FC236}">
+                <a16:creationId xmlns:a16="http://schemas.microsoft.com/office/drawing/2014/main" id="{FE4E0588-9D4A-AF50-59E6-6D460C86056D}"/>
+              </a:ext>
+            </a:extLst>
+          </p:cNvPr>
+          <p:cNvGrpSpPr/>
+          <p:nvPr/>
+        </p:nvGrpSpPr>
+        <p:grpSpPr>
+          <a:xfrm>
+            <a:off x="3501336" y="2978186"/>
+            <a:ext cx="1452646" cy="1785104"/>
+            <a:chOff x="5350594" y="2768838"/>
+            <a:chExt cx="1452646" cy="1785104"/>
+          </a:xfrm>
+        </p:grpSpPr>
+        <p:sp>
+          <p:nvSpPr>
+            <p:cNvPr id="8" name="TextBox 7">
+              <a:extLst>
+                <a:ext uri="{FF2B5EF4-FFF2-40B4-BE49-F238E27FC236}">
+                  <a16:creationId xmlns:a16="http://schemas.microsoft.com/office/drawing/2014/main" id="{2CCC8F63-8A94-8DDA-5986-BE84057D55C3}"/>
+                </a:ext>
+              </a:extLst>
+            </p:cNvPr>
+            <p:cNvSpPr txBox="1"/>
+            <p:nvPr/>
+          </p:nvSpPr>
+          <p:spPr>
+            <a:xfrm>
+              <a:off x="6120040" y="2792850"/>
+              <a:ext cx="683200" cy="1169551"/>
+            </a:xfrm>
+            <a:prstGeom prst="rect">
+              <a:avLst/>
+            </a:prstGeom>
+            <a:noFill/>
+          </p:spPr>
+          <p:txBody>
+            <a:bodyPr wrap="none" rtlCol="0">
+              <a:spAutoFit/>
+            </a:bodyPr>
+            <a:lstStyle/>
+            <a:p>
+              <a:r>
+                <a:rPr lang="en-US" sz="7000" dirty="0">
+                  <a:solidFill>
+                    <a:schemeClr val="bg1"/>
+                  </a:solidFill>
+                  <a:latin typeface="Arial" panose="020B0604020202020204" pitchFamily="34" charset="0"/>
+                  <a:cs typeface="Arial" panose="020B0604020202020204" pitchFamily="34" charset="0"/>
+                </a:rPr>
+                <a:t>2</a:t>
+              </a:r>
+            </a:p>
+          </p:txBody>
+        </p:sp>
+        <p:sp>
+          <p:nvSpPr>
+            <p:cNvPr id="9" name="TextBox 8">
+              <a:extLst>
+                <a:ext uri="{FF2B5EF4-FFF2-40B4-BE49-F238E27FC236}">
+                  <a16:creationId xmlns:a16="http://schemas.microsoft.com/office/drawing/2014/main" id="{E4C5BDAB-88C7-7306-3E96-1436BE144C12}"/>
+                </a:ext>
+              </a:extLst>
+            </p:cNvPr>
+            <p:cNvSpPr txBox="1"/>
+            <p:nvPr/>
+          </p:nvSpPr>
+          <p:spPr>
+            <a:xfrm>
+              <a:off x="5350594" y="2768838"/>
+              <a:ext cx="732893" cy="1785104"/>
+            </a:xfrm>
+            <a:prstGeom prst="rect">
+              <a:avLst/>
+            </a:prstGeom>
+            <a:noFill/>
+          </p:spPr>
+          <p:txBody>
+            <a:bodyPr wrap="none" rtlCol="0">
+              <a:spAutoFit/>
+            </a:bodyPr>
+            <a:lstStyle/>
+            <a:p>
+              <a:r>
+                <a:rPr lang="en-US" sz="11000" dirty="0">
+                  <a:solidFill>
+                    <a:schemeClr val="bg1"/>
+                  </a:solidFill>
+                  <a:latin typeface="Arial" panose="020B0604020202020204" pitchFamily="34" charset="0"/>
+                  <a:cs typeface="Arial" panose="020B0604020202020204" pitchFamily="34" charset="0"/>
+                </a:rPr>
+                <a:t>*</a:t>
+              </a:r>
+            </a:p>
+          </p:txBody>
+        </p:sp>
+      </p:grpSp>
+      <p:sp>
+        <p:nvSpPr>
+          <p:cNvPr id="10" name="TextBox 9">
+            <a:extLst>
+              <a:ext uri="{FF2B5EF4-FFF2-40B4-BE49-F238E27FC236}">
+                <a16:creationId xmlns:a16="http://schemas.microsoft.com/office/drawing/2014/main" id="{F5A1A7EC-C14A-DB0F-D286-093A0B6B176F}"/>
+              </a:ext>
+            </a:extLst>
+          </p:cNvPr>
+          <p:cNvSpPr txBox="1"/>
+          <p:nvPr/>
+        </p:nvSpPr>
+        <p:spPr>
+          <a:xfrm>
+            <a:off x="3511758" y="4118962"/>
+            <a:ext cx="1431802" cy="1169551"/>
+          </a:xfrm>
+          <a:prstGeom prst="rect">
+            <a:avLst/>
+          </a:prstGeom>
+          <a:noFill/>
+        </p:spPr>
+        <p:txBody>
+          <a:bodyPr wrap="none" rtlCol="0">
+            <a:spAutoFit/>
+          </a:bodyPr>
+          <a:lstStyle/>
+          <a:p>
+            <a:r>
+              <a:rPr lang="en-US" sz="7000" dirty="0">
+                <a:solidFill>
+                  <a:schemeClr val="bg1"/>
+                </a:solidFill>
+                <a:latin typeface="Arial" panose="020B0604020202020204" pitchFamily="34" charset="0"/>
+                <a:cs typeface="Arial" panose="020B0604020202020204" pitchFamily="34" charset="0"/>
+              </a:rPr>
+              <a:t>2 1</a:t>
+            </a:r>
+          </a:p>
+        </p:txBody>
+      </p:sp>
+      <p:grpSp>
+        <p:nvGrpSpPr>
+          <p:cNvPr id="11" name="Group 10">
+            <a:extLst>
+              <a:ext uri="{FF2B5EF4-FFF2-40B4-BE49-F238E27FC236}">
+                <a16:creationId xmlns:a16="http://schemas.microsoft.com/office/drawing/2014/main" id="{4336BC23-7823-B44F-983D-211D41D6B947}"/>
+              </a:ext>
+            </a:extLst>
+          </p:cNvPr>
+          <p:cNvGrpSpPr/>
+          <p:nvPr/>
+        </p:nvGrpSpPr>
+        <p:grpSpPr>
+          <a:xfrm>
+            <a:off x="3487862" y="5262388"/>
+            <a:ext cx="1479595" cy="1786120"/>
+            <a:chOff x="5350594" y="2820998"/>
+            <a:chExt cx="1479595" cy="1786120"/>
+          </a:xfrm>
+        </p:grpSpPr>
+        <p:sp>
+          <p:nvSpPr>
+            <p:cNvPr id="12" name="TextBox 11">
+              <a:extLst>
+                <a:ext uri="{FF2B5EF4-FFF2-40B4-BE49-F238E27FC236}">
+                  <a16:creationId xmlns:a16="http://schemas.microsoft.com/office/drawing/2014/main" id="{2F52C9DF-5659-786E-2E76-88959D24B871}"/>
+                </a:ext>
+              </a:extLst>
+            </p:cNvPr>
+            <p:cNvSpPr txBox="1"/>
+            <p:nvPr/>
+          </p:nvSpPr>
+          <p:spPr>
+            <a:xfrm>
+              <a:off x="6097296" y="2822014"/>
+              <a:ext cx="732893" cy="1785104"/>
+            </a:xfrm>
+            <a:prstGeom prst="rect">
+              <a:avLst/>
+            </a:prstGeom>
+            <a:noFill/>
+          </p:spPr>
+          <p:txBody>
+            <a:bodyPr wrap="none" rtlCol="0">
+              <a:spAutoFit/>
+            </a:bodyPr>
+            <a:lstStyle/>
+            <a:p>
+              <a:r>
+                <a:rPr lang="en-US" sz="11000" dirty="0">
+                  <a:solidFill>
+                    <a:schemeClr val="bg1"/>
+                  </a:solidFill>
+                  <a:latin typeface="Arial" panose="020B0604020202020204" pitchFamily="34" charset="0"/>
+                  <a:cs typeface="Arial" panose="020B0604020202020204" pitchFamily="34" charset="0"/>
+                </a:rPr>
+                <a:t>*</a:t>
+              </a:r>
+            </a:p>
+          </p:txBody>
+        </p:sp>
+        <p:sp>
+          <p:nvSpPr>
+            <p:cNvPr id="13" name="TextBox 12">
+              <a:extLst>
+                <a:ext uri="{FF2B5EF4-FFF2-40B4-BE49-F238E27FC236}">
+                  <a16:creationId xmlns:a16="http://schemas.microsoft.com/office/drawing/2014/main" id="{978E4539-6047-F48E-9A68-DC9CD2653D29}"/>
+                </a:ext>
+              </a:extLst>
+            </p:cNvPr>
+            <p:cNvSpPr txBox="1"/>
+            <p:nvPr/>
+          </p:nvSpPr>
+          <p:spPr>
+            <a:xfrm>
+              <a:off x="5350594" y="2820998"/>
+              <a:ext cx="732893" cy="1785104"/>
+            </a:xfrm>
+            <a:prstGeom prst="rect">
+              <a:avLst/>
+            </a:prstGeom>
+            <a:noFill/>
+          </p:spPr>
+          <p:txBody>
+            <a:bodyPr wrap="none" rtlCol="0">
+              <a:spAutoFit/>
+            </a:bodyPr>
+            <a:lstStyle/>
+            <a:p>
+              <a:r>
+                <a:rPr lang="en-US" sz="11000" dirty="0">
+                  <a:solidFill>
+                    <a:schemeClr val="bg1"/>
+                  </a:solidFill>
+                  <a:latin typeface="Arial" panose="020B0604020202020204" pitchFamily="34" charset="0"/>
+                  <a:cs typeface="Arial" panose="020B0604020202020204" pitchFamily="34" charset="0"/>
+                </a:rPr>
+                <a:t>*</a:t>
+              </a:r>
+            </a:p>
+          </p:txBody>
+        </p:sp>
+      </p:grpSp>
     </p:spTree>
     <p:extLst>
       <p:ext uri="{BB962C8B-B14F-4D97-AF65-F5344CB8AC3E}">

</xml_diff>